<commit_message>
Last update to pptx slides
</commit_message>
<xml_diff>
--- a/2020-04-17_presentation/dna_art.pptx
+++ b/2020-04-17_presentation/dna_art.pptx
@@ -5,10 +5,10 @@
     <p:sldMasterId id="2147483648" r:id="rId4"/>
   </p:sldMasterIdLst>
   <p:notesMasterIdLst>
-    <p:notesMasterId r:id="rId11"/>
+    <p:notesMasterId r:id="rId13"/>
   </p:notesMasterIdLst>
   <p:handoutMasterIdLst>
-    <p:handoutMasterId r:id="rId12"/>
+    <p:handoutMasterId r:id="rId14"/>
   </p:handoutMasterIdLst>
   <p:sldIdLst>
     <p:sldId id="326" r:id="rId5"/>
@@ -16,7 +16,9 @@
     <p:sldId id="351" r:id="rId7"/>
     <p:sldId id="354" r:id="rId8"/>
     <p:sldId id="352" r:id="rId9"/>
-    <p:sldId id="353" r:id="rId10"/>
+    <p:sldId id="356" r:id="rId10"/>
+    <p:sldId id="355" r:id="rId11"/>
+    <p:sldId id="353" r:id="rId12"/>
   </p:sldIdLst>
   <p:sldSz cx="12192000" cy="6858000"/>
   <p:notesSz cx="6858000" cy="9144000"/>
@@ -243,7 +245,7 @@
             <a:fld id="{EC34C92B-6A45-864A-B429-22A9039765DA}" type="datetimeFigureOut">
               <a:rPr lang="en-US" smtClean="0"/>
               <a:pPr/>
-              <a:t>4/17/2020</a:t>
+              <a:t>4/23/2020</a:t>
             </a:fld>
             <a:endParaRPr lang="en-US" dirty="0"/>
           </a:p>
@@ -422,7 +424,7 @@
             <a:fld id="{0D265FE6-BEE9-465E-9202-2D200EDE749C}" type="datetimeFigureOut">
               <a:rPr lang="en-GB" smtClean="0"/>
               <a:pPr/>
-              <a:t>17/04/2020</a:t>
+              <a:t>23/04/2020</a:t>
             </a:fld>
             <a:endParaRPr lang="en-GB" dirty="0"/>
           </a:p>
@@ -1194,6 +1196,188 @@
               <a:rPr lang="en-GB" smtClean="0"/>
               <a:pPr/>
               <a:t>6</a:t>
+            </a:fld>
+            <a:endParaRPr lang="en-GB" dirty="0"/>
+          </a:p>
+        </p:txBody>
+      </p:sp>
+    </p:spTree>
+    <p:extLst>
+      <p:ext uri="{BB962C8B-B14F-4D97-AF65-F5344CB8AC3E}">
+        <p14:creationId xmlns:p14="http://schemas.microsoft.com/office/powerpoint/2010/main" val="811088107"/>
+      </p:ext>
+    </p:extLst>
+  </p:cSld>
+  <p:clrMapOvr>
+    <a:masterClrMapping/>
+  </p:clrMapOvr>
+</p:notes>
+</file>
+
+<file path=ppt/notesSlides/notesSlide7.xml><?xml version="1.0" encoding="utf-8"?>
+<p:notes xmlns:a="http://schemas.openxmlformats.org/drawingml/2006/main" xmlns:r="http://schemas.openxmlformats.org/officeDocument/2006/relationships" xmlns:p="http://schemas.openxmlformats.org/presentationml/2006/main">
+  <p:cSld>
+    <p:spTree>
+      <p:nvGrpSpPr>
+        <p:cNvPr id="1" name=""/>
+        <p:cNvGrpSpPr/>
+        <p:nvPr/>
+      </p:nvGrpSpPr>
+      <p:grpSpPr>
+        <a:xfrm>
+          <a:off x="0" y="0"/>
+          <a:ext cx="0" cy="0"/>
+          <a:chOff x="0" y="0"/>
+          <a:chExt cx="0" cy="0"/>
+        </a:xfrm>
+      </p:grpSpPr>
+      <p:sp>
+        <p:nvSpPr>
+          <p:cNvPr id="2" name="1 Marcador de imagen de diapositiva"/>
+          <p:cNvSpPr>
+            <a:spLocks noGrp="1" noRot="1" noChangeAspect="1"/>
+          </p:cNvSpPr>
+          <p:nvPr>
+            <p:ph type="sldImg"/>
+          </p:nvPr>
+        </p:nvSpPr>
+        <p:spPr/>
+      </p:sp>
+      <p:sp>
+        <p:nvSpPr>
+          <p:cNvPr id="3" name="2 Marcador de notas"/>
+          <p:cNvSpPr>
+            <a:spLocks noGrp="1"/>
+          </p:cNvSpPr>
+          <p:nvPr>
+            <p:ph type="body" idx="1"/>
+          </p:nvPr>
+        </p:nvSpPr>
+        <p:spPr/>
+        <p:txBody>
+          <a:bodyPr>
+            <a:normAutofit/>
+          </a:bodyPr>
+          <a:lstStyle/>
+          <a:p>
+            <a:pPr>
+              <a:buFontTx/>
+              <a:buChar char="-"/>
+            </a:pPr>
+            <a:endParaRPr lang="es-ES" sz="1000" dirty="0"/>
+          </a:p>
+        </p:txBody>
+      </p:sp>
+      <p:sp>
+        <p:nvSpPr>
+          <p:cNvPr id="4" name="3 Marcador de número de diapositiva"/>
+          <p:cNvSpPr>
+            <a:spLocks noGrp="1"/>
+          </p:cNvSpPr>
+          <p:nvPr>
+            <p:ph type="sldNum" sz="quarter" idx="10"/>
+          </p:nvPr>
+        </p:nvSpPr>
+        <p:spPr/>
+        <p:txBody>
+          <a:bodyPr/>
+          <a:lstStyle/>
+          <a:p>
+            <a:fld id="{F6DE8F2A-B3D4-43F2-B39B-CD77F64A1950}" type="slidenum">
+              <a:rPr lang="en-GB" smtClean="0"/>
+              <a:pPr/>
+              <a:t>7</a:t>
+            </a:fld>
+            <a:endParaRPr lang="en-GB" dirty="0"/>
+          </a:p>
+        </p:txBody>
+      </p:sp>
+    </p:spTree>
+    <p:extLst>
+      <p:ext uri="{BB962C8B-B14F-4D97-AF65-F5344CB8AC3E}">
+        <p14:creationId xmlns:p14="http://schemas.microsoft.com/office/powerpoint/2010/main" val="1602951791"/>
+      </p:ext>
+    </p:extLst>
+  </p:cSld>
+  <p:clrMapOvr>
+    <a:masterClrMapping/>
+  </p:clrMapOvr>
+</p:notes>
+</file>
+
+<file path=ppt/notesSlides/notesSlide8.xml><?xml version="1.0" encoding="utf-8"?>
+<p:notes xmlns:a="http://schemas.openxmlformats.org/drawingml/2006/main" xmlns:r="http://schemas.openxmlformats.org/officeDocument/2006/relationships" xmlns:p="http://schemas.openxmlformats.org/presentationml/2006/main">
+  <p:cSld>
+    <p:spTree>
+      <p:nvGrpSpPr>
+        <p:cNvPr id="1" name=""/>
+        <p:cNvGrpSpPr/>
+        <p:nvPr/>
+      </p:nvGrpSpPr>
+      <p:grpSpPr>
+        <a:xfrm>
+          <a:off x="0" y="0"/>
+          <a:ext cx="0" cy="0"/>
+          <a:chOff x="0" y="0"/>
+          <a:chExt cx="0" cy="0"/>
+        </a:xfrm>
+      </p:grpSpPr>
+      <p:sp>
+        <p:nvSpPr>
+          <p:cNvPr id="2" name="1 Marcador de imagen de diapositiva"/>
+          <p:cNvSpPr>
+            <a:spLocks noGrp="1" noRot="1" noChangeAspect="1"/>
+          </p:cNvSpPr>
+          <p:nvPr>
+            <p:ph type="sldImg"/>
+          </p:nvPr>
+        </p:nvSpPr>
+        <p:spPr/>
+      </p:sp>
+      <p:sp>
+        <p:nvSpPr>
+          <p:cNvPr id="3" name="2 Marcador de notas"/>
+          <p:cNvSpPr>
+            <a:spLocks noGrp="1"/>
+          </p:cNvSpPr>
+          <p:nvPr>
+            <p:ph type="body" idx="1"/>
+          </p:nvPr>
+        </p:nvSpPr>
+        <p:spPr/>
+        <p:txBody>
+          <a:bodyPr>
+            <a:normAutofit/>
+          </a:bodyPr>
+          <a:lstStyle/>
+          <a:p>
+            <a:pPr>
+              <a:buFontTx/>
+              <a:buChar char="-"/>
+            </a:pPr>
+            <a:endParaRPr lang="es-ES" sz="1000" dirty="0"/>
+          </a:p>
+        </p:txBody>
+      </p:sp>
+      <p:sp>
+        <p:nvSpPr>
+          <p:cNvPr id="4" name="3 Marcador de número de diapositiva"/>
+          <p:cNvSpPr>
+            <a:spLocks noGrp="1"/>
+          </p:cNvSpPr>
+          <p:nvPr>
+            <p:ph type="sldNum" sz="quarter" idx="10"/>
+          </p:nvPr>
+        </p:nvSpPr>
+        <p:spPr/>
+        <p:txBody>
+          <a:bodyPr/>
+          <a:lstStyle/>
+          <a:p>
+            <a:fld id="{F6DE8F2A-B3D4-43F2-B39B-CD77F64A1950}" type="slidenum">
+              <a:rPr lang="en-GB" smtClean="0"/>
+              <a:pPr/>
+              <a:t>8</a:t>
             </a:fld>
             <a:endParaRPr lang="en-GB" dirty="0"/>
           </a:p>
@@ -11593,7 +11777,7 @@
         <p:spPr>
           <a:xfrm>
             <a:off x="685193" y="2187365"/>
-            <a:ext cx="10440000" cy="2092881"/>
+            <a:ext cx="10440000" cy="2492990"/>
           </a:xfrm>
           <a:prstGeom prst="rect">
             <a:avLst/>
@@ -11608,7 +11792,15 @@
           <a:p>
             <a:r>
               <a:rPr lang="en-GB" sz="2600" dirty="0"/>
-              <a:t>Teams choosing this challenge are expected to creatively use cutting-edge methods, such as generative adversarial networks (GANs). </a:t>
+              <a:t>Teams choosing this challenge are expected to creatively use cutting-edge methods, such as generative adversarial networks (GANs)</a:t>
+            </a:r>
+            <a:r>
+              <a:rPr lang="en-US" sz="2600" dirty="0"/>
+              <a:t>, to make art based on human DNA</a:t>
+            </a:r>
+            <a:r>
+              <a:rPr lang="en-GB" sz="2600" dirty="0"/>
+              <a:t>. </a:t>
             </a:r>
           </a:p>
           <a:p>
@@ -11761,7 +11953,7 @@
             <a:pPr algn="just"/>
             <a:r>
               <a:rPr lang="en-US" dirty="0"/>
-              <a:t>It is based on 1990 technology</a:t>
+              <a:t>It is based on 1990 DNA-technology</a:t>
             </a:r>
           </a:p>
         </p:txBody>
@@ -11851,7 +12043,7 @@
             <a:pPr algn="just"/>
             <a:r>
               <a:rPr lang="en-US" dirty="0"/>
-              <a:t>It is based on GAN technology</a:t>
+              <a:t>It is based on GAN technology. They don’t use DNA.</a:t>
             </a:r>
           </a:p>
         </p:txBody>
@@ -11951,7 +12143,7 @@
                   <a:schemeClr val="bg1"/>
                 </a:solidFill>
               </a:rPr>
-              <a:t>Output requirements</a:t>
+              <a:t>Details, suggestions and guidance</a:t>
             </a:r>
           </a:p>
         </p:txBody>
@@ -11964,8 +12156,8 @@
         </p:nvSpPr>
         <p:spPr>
           <a:xfrm>
-            <a:off x="0" y="6534835"/>
-            <a:ext cx="5252335" cy="323165"/>
+            <a:off x="0" y="6437299"/>
+            <a:ext cx="9137117" cy="569387"/>
           </a:xfrm>
           <a:prstGeom prst="rect">
             <a:avLst/>
@@ -11980,16 +12172,18 @@
           <a:p>
             <a:r>
               <a:rPr lang="en-US" sz="1500" dirty="0"/>
-              <a:t>Copenhagen Bioinformatics </a:t>
-            </a:r>
-            <a:r>
-              <a:rPr lang="en-US" sz="1500" dirty="0" err="1"/>
-              <a:t>Hackathon</a:t>
-            </a:r>
-            <a:r>
-              <a:rPr lang="en-US" sz="1500" dirty="0"/>
-              <a:t> 2020 – April 24 - 26</a:t>
-            </a:r>
+              <a:t>Copenhagen Bioinformatics Hackathon 2020 – April 24 - 26 ---  </a:t>
+            </a:r>
+            <a:r>
+              <a:rPr lang="da-DK" sz="1600" dirty="0">
+                <a:hlinkClick r:id="rId3"/>
+              </a:rPr>
+              <a:t>https://github.com/lassefolkersen/hackaton_art </a:t>
+            </a:r>
+            <a:endParaRPr lang="da-DK" sz="1600" dirty="0"/>
+          </a:p>
+          <a:p>
+            <a:endParaRPr lang="en-US" sz="1500" dirty="0"/>
           </a:p>
         </p:txBody>
       </p:sp>
@@ -12001,8 +12195,8 @@
         </p:nvSpPr>
         <p:spPr>
           <a:xfrm>
-            <a:off x="614854" y="1261241"/>
-            <a:ext cx="10440000" cy="5632311"/>
+            <a:off x="3329352" y="1370617"/>
+            <a:ext cx="10440000" cy="1200329"/>
           </a:xfrm>
           <a:prstGeom prst="rect">
             <a:avLst/>
@@ -12017,13 +12211,12 @@
           <a:p>
             <a:pPr algn="just"/>
             <a:r>
-              <a:rPr lang="en-US" b="1" dirty="0"/>
-              <a:t>Overall requirement: A prototype DNA-based art generator</a:t>
-            </a:r>
-          </a:p>
-          <a:p>
-            <a:pPr algn="just"/>
-            <a:endParaRPr lang="en-US" dirty="0"/>
+              <a:rPr lang="da-DK" dirty="0">
+                <a:hlinkClick r:id="rId3"/>
+              </a:rPr>
+              <a:t>https://github.com/lassefolkersen/hackaton_art </a:t>
+            </a:r>
+            <a:endParaRPr lang="da-DK" dirty="0"/>
           </a:p>
           <a:p>
             <a:pPr algn="just"/>
@@ -12031,171 +12224,43 @@
           </a:p>
           <a:p>
             <a:pPr algn="just"/>
-            <a:r>
-              <a:rPr lang="da-DK" dirty="0"/>
-              <a:t>In the </a:t>
-            </a:r>
-            <a:r>
-              <a:rPr lang="da-DK" dirty="0" err="1"/>
-              <a:t>detailed</a:t>
-            </a:r>
-            <a:r>
-              <a:rPr lang="da-DK" dirty="0"/>
-              <a:t> </a:t>
-            </a:r>
-            <a:r>
-              <a:rPr lang="da-DK" dirty="0" err="1"/>
-              <a:t>instructions</a:t>
-            </a:r>
-            <a:r>
-              <a:rPr lang="da-DK" dirty="0"/>
-              <a:t>, </a:t>
-            </a:r>
-            <a:r>
-              <a:rPr lang="da-DK" dirty="0" err="1"/>
-              <a:t>three</a:t>
-            </a:r>
-            <a:r>
-              <a:rPr lang="da-DK" dirty="0"/>
-              <a:t> </a:t>
-            </a:r>
-            <a:r>
-              <a:rPr lang="da-DK" dirty="0" err="1"/>
-              <a:t>work</a:t>
-            </a:r>
-            <a:r>
-              <a:rPr lang="da-DK" dirty="0"/>
-              <a:t> </a:t>
-            </a:r>
-            <a:r>
-              <a:rPr lang="da-DK" dirty="0" err="1"/>
-              <a:t>packages</a:t>
-            </a:r>
-            <a:r>
-              <a:rPr lang="da-DK" dirty="0"/>
-              <a:t> </a:t>
-            </a:r>
-            <a:r>
-              <a:rPr lang="da-DK" dirty="0" err="1"/>
-              <a:t>are</a:t>
-            </a:r>
-            <a:r>
-              <a:rPr lang="da-DK" dirty="0"/>
-              <a:t> </a:t>
-            </a:r>
-            <a:r>
-              <a:rPr lang="da-DK" dirty="0" err="1"/>
-              <a:t>suggested</a:t>
-            </a:r>
-            <a:r>
-              <a:rPr lang="da-DK" dirty="0"/>
-              <a:t>. </a:t>
-            </a:r>
-            <a:r>
-              <a:rPr lang="da-DK" u="sng" dirty="0" err="1"/>
-              <a:t>They</a:t>
-            </a:r>
-            <a:r>
-              <a:rPr lang="da-DK" u="sng" dirty="0"/>
-              <a:t> </a:t>
-            </a:r>
-            <a:r>
-              <a:rPr lang="da-DK" u="sng" dirty="0" err="1"/>
-              <a:t>are</a:t>
-            </a:r>
-            <a:r>
-              <a:rPr lang="da-DK" u="sng" dirty="0"/>
-              <a:t> </a:t>
-            </a:r>
-            <a:r>
-              <a:rPr lang="da-DK" u="sng" dirty="0" err="1"/>
-              <a:t>optional</a:t>
-            </a:r>
-            <a:r>
-              <a:rPr lang="da-DK" u="sng" dirty="0"/>
-              <a:t> suggestions!</a:t>
-            </a:r>
+            <a:endParaRPr lang="da-DK" dirty="0"/>
           </a:p>
           <a:p>
             <a:pPr algn="just"/>
             <a:endParaRPr lang="da-DK" dirty="0"/>
           </a:p>
-          <a:p>
-            <a:pPr algn="just"/>
-            <a:endParaRPr lang="da-DK" dirty="0"/>
-          </a:p>
-          <a:p>
-            <a:pPr algn="just"/>
-            <a:r>
-              <a:rPr lang="en-GB" dirty="0"/>
-              <a:t>	WP 1 implement automatic generation of pictures using </a:t>
-            </a:r>
-            <a:r>
-              <a:rPr lang="en-GB" dirty="0">
-                <a:hlinkClick r:id="rId3"/>
-              </a:rPr>
-              <a:t>GAN</a:t>
-            </a:r>
-            <a:r>
-              <a:rPr lang="en-GB" dirty="0"/>
-              <a:t>-approaches together with DNA-	information input</a:t>
-            </a:r>
-          </a:p>
-          <a:p>
-            <a:pPr algn="just"/>
-            <a:endParaRPr lang="en-GB" dirty="0"/>
-          </a:p>
-          <a:p>
-            <a:pPr algn="just"/>
-            <a:r>
-              <a:rPr lang="en-GB" dirty="0"/>
-              <a:t>	WP 2 train the outputting generator based on user-feedback (“like” or “not like”), using DNA-based 	variables as training data</a:t>
-            </a:r>
-          </a:p>
-          <a:p>
-            <a:pPr algn="just"/>
-            <a:endParaRPr lang="en-GB" dirty="0"/>
-          </a:p>
-          <a:p>
-            <a:pPr algn="just"/>
-            <a:r>
-              <a:rPr lang="en-GB" dirty="0"/>
-              <a:t>	WP 3 showcase running algorithm using the provided test DNA-samples</a:t>
-            </a:r>
-          </a:p>
-          <a:p>
-            <a:pPr algn="just"/>
-            <a:endParaRPr lang="en-GB" dirty="0"/>
-          </a:p>
-          <a:p>
-            <a:pPr algn="just"/>
-            <a:endParaRPr lang="en-GB" i="1" dirty="0"/>
-          </a:p>
-          <a:p>
-            <a:pPr algn="just"/>
-            <a:r>
-              <a:rPr lang="en-GB" i="1" dirty="0"/>
-              <a:t>But! sole criteria for evaluating success of this project is : ability to catch interest of viewers. </a:t>
-            </a:r>
-          </a:p>
-          <a:p>
-            <a:pPr algn="just"/>
-            <a:endParaRPr lang="da-DK" dirty="0"/>
-          </a:p>
-          <a:p>
-            <a:pPr algn="just"/>
-            <a:endParaRPr lang="da-DK" dirty="0"/>
-          </a:p>
-          <a:p>
-            <a:pPr algn="just"/>
-            <a:endParaRPr lang="da-DK" dirty="0"/>
-          </a:p>
-          <a:p>
-            <a:pPr algn="just"/>
-            <a:endParaRPr lang="da-DK" dirty="0"/>
-          </a:p>
-        </p:txBody>
-      </p:sp>
+        </p:txBody>
+      </p:sp>
+      <p:pic>
+        <p:nvPicPr>
+          <p:cNvPr id="2" name="Picture 1">
+            <a:extLst>
+              <a:ext uri="{FF2B5EF4-FFF2-40B4-BE49-F238E27FC236}">
+                <a16:creationId xmlns:a16="http://schemas.microsoft.com/office/drawing/2014/main" id="{EB6BF684-81D0-4604-AC72-F79E6ECB0A4B}"/>
+              </a:ext>
+            </a:extLst>
+          </p:cNvPr>
+          <p:cNvPicPr>
+            <a:picLocks noChangeAspect="1"/>
+          </p:cNvPicPr>
+          <p:nvPr/>
+        </p:nvPicPr>
+        <p:blipFill rotWithShape="1">
+          <a:blip r:embed="rId4"/>
+          <a:srcRect l="21730" r="21827" b="4712"/>
+          <a:stretch/>
+        </p:blipFill>
+        <p:spPr>
+          <a:xfrm>
+            <a:off x="3329352" y="1790790"/>
+            <a:ext cx="4560611" cy="4330897"/>
+          </a:xfrm>
+          <a:prstGeom prst="rect">
+            <a:avLst/>
+          </a:prstGeom>
+        </p:spPr>
+      </p:pic>
     </p:spTree>
     <p:extLst>
       <p:ext uri="{BB962C8B-B14F-4D97-AF65-F5344CB8AC3E}">
@@ -12261,21 +12326,21 @@
                   <a:schemeClr val="bg1"/>
                 </a:solidFill>
               </a:rPr>
-              <a:t>Resources available</a:t>
-            </a:r>
-          </a:p>
-        </p:txBody>
-      </p:sp>
-      <p:sp>
-        <p:nvSpPr>
-          <p:cNvPr id="3" name="2 CuadroTexto"/>
+              <a:t>Details, suggestions and guidance</a:t>
+            </a:r>
+          </a:p>
+        </p:txBody>
+      </p:sp>
+      <p:sp>
+        <p:nvSpPr>
+          <p:cNvPr id="4" name="3 CuadroTexto"/>
           <p:cNvSpPr txBox="1"/>
           <p:nvPr/>
         </p:nvSpPr>
         <p:spPr>
           <a:xfrm>
-            <a:off x="0" y="6534835"/>
-            <a:ext cx="5252335" cy="323165"/>
+            <a:off x="3329352" y="1370617"/>
+            <a:ext cx="10440000" cy="1200329"/>
           </a:xfrm>
           <a:prstGeom prst="rect">
             <a:avLst/>
@@ -12283,6 +12348,86 @@
           <a:noFill/>
         </p:spPr>
         <p:txBody>
+          <a:bodyPr wrap="square" rtlCol="0">
+            <a:spAutoFit/>
+          </a:bodyPr>
+          <a:lstStyle/>
+          <a:p>
+            <a:pPr algn="just"/>
+            <a:r>
+              <a:rPr lang="da-DK" dirty="0">
+                <a:hlinkClick r:id="rId3"/>
+              </a:rPr>
+              <a:t>https://github.com/lassefolkersen/hackaton_art </a:t>
+            </a:r>
+            <a:endParaRPr lang="da-DK" dirty="0"/>
+          </a:p>
+          <a:p>
+            <a:pPr algn="just"/>
+            <a:endParaRPr lang="da-DK" dirty="0"/>
+          </a:p>
+          <a:p>
+            <a:pPr algn="just"/>
+            <a:endParaRPr lang="da-DK" dirty="0"/>
+          </a:p>
+          <a:p>
+            <a:pPr algn="just"/>
+            <a:endParaRPr lang="da-DK" dirty="0"/>
+          </a:p>
+        </p:txBody>
+      </p:sp>
+      <p:pic>
+        <p:nvPicPr>
+          <p:cNvPr id="5" name="Picture 4">
+            <a:extLst>
+              <a:ext uri="{FF2B5EF4-FFF2-40B4-BE49-F238E27FC236}">
+                <a16:creationId xmlns:a16="http://schemas.microsoft.com/office/drawing/2014/main" id="{533FF187-EDAD-4711-AB5F-36C7C2238A0B}"/>
+              </a:ext>
+            </a:extLst>
+          </p:cNvPr>
+          <p:cNvPicPr>
+            <a:picLocks noChangeAspect="1"/>
+          </p:cNvPicPr>
+          <p:nvPr/>
+        </p:nvPicPr>
+        <p:blipFill rotWithShape="1">
+          <a:blip r:embed="rId4"/>
+          <a:srcRect l="23365" r="24519" b="31966"/>
+          <a:stretch/>
+        </p:blipFill>
+        <p:spPr>
+          <a:xfrm>
+            <a:off x="3329352" y="1794614"/>
+            <a:ext cx="5028845" cy="3692769"/>
+          </a:xfrm>
+          <a:prstGeom prst="rect">
+            <a:avLst/>
+          </a:prstGeom>
+        </p:spPr>
+      </p:pic>
+      <p:sp>
+        <p:nvSpPr>
+          <p:cNvPr id="7" name="2 CuadroTexto">
+            <a:extLst>
+              <a:ext uri="{FF2B5EF4-FFF2-40B4-BE49-F238E27FC236}">
+                <a16:creationId xmlns:a16="http://schemas.microsoft.com/office/drawing/2014/main" id="{93565E10-4504-4781-959B-6E494BB4FF02}"/>
+              </a:ext>
+            </a:extLst>
+          </p:cNvPr>
+          <p:cNvSpPr txBox="1"/>
+          <p:nvPr/>
+        </p:nvSpPr>
+        <p:spPr>
+          <a:xfrm>
+            <a:off x="0" y="6437299"/>
+            <a:ext cx="9137117" cy="569387"/>
+          </a:xfrm>
+          <a:prstGeom prst="rect">
+            <a:avLst/>
+          </a:prstGeom>
+          <a:noFill/>
+        </p:spPr>
+        <p:txBody>
           <a:bodyPr wrap="none" rtlCol="0">
             <a:spAutoFit/>
           </a:bodyPr>
@@ -12290,15 +12435,373 @@
           <a:p>
             <a:r>
               <a:rPr lang="en-US" sz="1500" dirty="0"/>
-              <a:t>Copenhagen Bioinformatics </a:t>
-            </a:r>
-            <a:r>
-              <a:rPr lang="en-US" sz="1500" dirty="0" err="1"/>
-              <a:t>Hackathon</a:t>
-            </a:r>
+              <a:t>Copenhagen Bioinformatics Hackathon 2020 – April 24 - 26 ---  </a:t>
+            </a:r>
+            <a:r>
+              <a:rPr lang="da-DK" sz="1600" dirty="0">
+                <a:hlinkClick r:id="rId3"/>
+              </a:rPr>
+              <a:t>https://github.com/lassefolkersen/hackaton_art </a:t>
+            </a:r>
+            <a:endParaRPr lang="da-DK" sz="1600" dirty="0"/>
+          </a:p>
+          <a:p>
+            <a:endParaRPr lang="en-US" sz="1500" dirty="0"/>
+          </a:p>
+        </p:txBody>
+      </p:sp>
+    </p:spTree>
+    <p:extLst>
+      <p:ext uri="{BB962C8B-B14F-4D97-AF65-F5344CB8AC3E}">
+        <p14:creationId xmlns:p14="http://schemas.microsoft.com/office/powerpoint/2010/main" val="1565322218"/>
+      </p:ext>
+    </p:extLst>
+  </p:cSld>
+  <p:clrMapOvr>
+    <a:masterClrMapping/>
+  </p:clrMapOvr>
+</p:sld>
+</file>
+
+<file path=ppt/slides/slide7.xml><?xml version="1.0" encoding="utf-8"?>
+<p:sld xmlns:a="http://schemas.openxmlformats.org/drawingml/2006/main" xmlns:r="http://schemas.openxmlformats.org/officeDocument/2006/relationships" xmlns:p="http://schemas.openxmlformats.org/presentationml/2006/main">
+  <p:cSld>
+    <p:spTree>
+      <p:nvGrpSpPr>
+        <p:cNvPr id="1" name=""/>
+        <p:cNvGrpSpPr/>
+        <p:nvPr/>
+      </p:nvGrpSpPr>
+      <p:grpSpPr>
+        <a:xfrm>
+          <a:off x="0" y="0"/>
+          <a:ext cx="0" cy="0"/>
+          <a:chOff x="0" y="0"/>
+          <a:chExt cx="0" cy="0"/>
+        </a:xfrm>
+      </p:grpSpPr>
+      <p:sp>
+        <p:nvSpPr>
+          <p:cNvPr id="10" name="Title 9">
+            <a:extLst>
+              <a:ext uri="{FF2B5EF4-FFF2-40B4-BE49-F238E27FC236}">
+                <a16:creationId xmlns:a16="http://schemas.microsoft.com/office/drawing/2014/main" id="{24FAFA63-EF73-4268-8107-6CD20923D700}"/>
+              </a:ext>
+            </a:extLst>
+          </p:cNvPr>
+          <p:cNvSpPr>
+            <a:spLocks noGrp="1"/>
+          </p:cNvSpPr>
+          <p:nvPr>
+            <p:ph type="title"/>
+          </p:nvPr>
+        </p:nvSpPr>
+        <p:spPr>
+          <a:xfrm>
+            <a:off x="0" y="239449"/>
+            <a:ext cx="12192000" cy="571301"/>
+          </a:xfrm>
+          <a:solidFill>
+            <a:schemeClr val="accent2"/>
+          </a:solidFill>
+        </p:spPr>
+        <p:txBody>
+          <a:bodyPr lIns="468000" tIns="36000" rIns="180000" bIns="36000"/>
+          <a:lstStyle/>
+          <a:p>
+            <a:r>
+              <a:rPr lang="en-US" b="0" dirty="0">
+                <a:solidFill>
+                  <a:schemeClr val="bg1"/>
+                </a:solidFill>
+              </a:rPr>
+              <a:t>Output requirements</a:t>
+            </a:r>
+          </a:p>
+        </p:txBody>
+      </p:sp>
+      <p:sp>
+        <p:nvSpPr>
+          <p:cNvPr id="4" name="3 CuadroTexto"/>
+          <p:cNvSpPr txBox="1"/>
+          <p:nvPr/>
+        </p:nvSpPr>
+        <p:spPr>
+          <a:xfrm>
+            <a:off x="614854" y="1261241"/>
+            <a:ext cx="10440000" cy="5078313"/>
+          </a:xfrm>
+          <a:prstGeom prst="rect">
+            <a:avLst/>
+          </a:prstGeom>
+          <a:noFill/>
+        </p:spPr>
+        <p:txBody>
+          <a:bodyPr wrap="square" rtlCol="0">
+            <a:spAutoFit/>
+          </a:bodyPr>
+          <a:lstStyle/>
+          <a:p>
+            <a:pPr algn="just"/>
+            <a:r>
+              <a:rPr lang="en-US" b="1" dirty="0"/>
+              <a:t>Overall goal: A prototype DNA-based art generator</a:t>
+            </a:r>
+          </a:p>
+          <a:p>
+            <a:pPr algn="just"/>
+            <a:endParaRPr lang="en-US" dirty="0"/>
+          </a:p>
+          <a:p>
+            <a:pPr algn="just"/>
+            <a:r>
+              <a:rPr lang="da-DK" dirty="0"/>
+              <a:t>Three </a:t>
+            </a:r>
+            <a:r>
+              <a:rPr lang="da-DK" dirty="0" err="1"/>
+              <a:t>work</a:t>
+            </a:r>
+            <a:r>
+              <a:rPr lang="da-DK" dirty="0"/>
+              <a:t> </a:t>
+            </a:r>
+            <a:r>
+              <a:rPr lang="da-DK" dirty="0" err="1"/>
+              <a:t>packages</a:t>
+            </a:r>
+            <a:r>
+              <a:rPr lang="da-DK" dirty="0"/>
+              <a:t> </a:t>
+            </a:r>
+            <a:r>
+              <a:rPr lang="da-DK" dirty="0" err="1"/>
+              <a:t>are</a:t>
+            </a:r>
+            <a:r>
+              <a:rPr lang="da-DK" dirty="0"/>
+              <a:t> </a:t>
+            </a:r>
+            <a:r>
+              <a:rPr lang="da-DK" dirty="0" err="1"/>
+              <a:t>suggested</a:t>
+            </a:r>
+            <a:r>
+              <a:rPr lang="da-DK" dirty="0"/>
+              <a:t>. </a:t>
+            </a:r>
+            <a:r>
+              <a:rPr lang="da-DK" u="sng" dirty="0" err="1"/>
+              <a:t>They</a:t>
+            </a:r>
+            <a:r>
+              <a:rPr lang="da-DK" u="sng" dirty="0"/>
+              <a:t> </a:t>
+            </a:r>
+            <a:r>
+              <a:rPr lang="da-DK" u="sng" dirty="0" err="1"/>
+              <a:t>are</a:t>
+            </a:r>
+            <a:r>
+              <a:rPr lang="da-DK" u="sng" dirty="0"/>
+              <a:t> </a:t>
+            </a:r>
+            <a:r>
+              <a:rPr lang="da-DK" u="sng" dirty="0" err="1"/>
+              <a:t>optional</a:t>
+            </a:r>
+            <a:r>
+              <a:rPr lang="da-DK" u="sng" dirty="0"/>
+              <a:t> suggestions!</a:t>
+            </a:r>
+          </a:p>
+          <a:p>
+            <a:pPr algn="just"/>
+            <a:endParaRPr lang="da-DK" dirty="0"/>
+          </a:p>
+          <a:p>
+            <a:pPr algn="just"/>
+            <a:r>
+              <a:rPr lang="en-GB" dirty="0"/>
+              <a:t>	WP 1 implement automatic generation of pictures using </a:t>
+            </a:r>
+            <a:r>
+              <a:rPr lang="en-GB" dirty="0">
+                <a:hlinkClick r:id="rId3"/>
+              </a:rPr>
+              <a:t>GAN</a:t>
+            </a:r>
+            <a:r>
+              <a:rPr lang="en-GB" dirty="0"/>
+              <a:t>-approaches together with DNA-	information input</a:t>
+            </a:r>
+          </a:p>
+          <a:p>
+            <a:pPr algn="just"/>
+            <a:endParaRPr lang="en-GB" dirty="0"/>
+          </a:p>
+          <a:p>
+            <a:pPr algn="just"/>
+            <a:r>
+              <a:rPr lang="en-GB" dirty="0"/>
+              <a:t>	WP 2 train the outputting generator based on user-feedback (“like” or “not like”), using DNA-based 	variables as training data</a:t>
+            </a:r>
+          </a:p>
+          <a:p>
+            <a:pPr algn="just"/>
+            <a:endParaRPr lang="en-GB" dirty="0"/>
+          </a:p>
+          <a:p>
+            <a:pPr algn="just"/>
+            <a:r>
+              <a:rPr lang="en-GB" dirty="0"/>
+              <a:t>	WP 3 showcase running algorithm using the provided test DNA-samples</a:t>
+            </a:r>
+          </a:p>
+          <a:p>
+            <a:pPr algn="just"/>
+            <a:endParaRPr lang="en-GB" dirty="0"/>
+          </a:p>
+          <a:p>
+            <a:pPr algn="just"/>
+            <a:endParaRPr lang="en-GB" i="1" dirty="0"/>
+          </a:p>
+          <a:p>
+            <a:pPr algn="just"/>
+            <a:r>
+              <a:rPr lang="en-GB" i="1" dirty="0"/>
+              <a:t>But!! The sole criteria for evaluating success of this project is : ability to catch interest of viewers. </a:t>
+            </a:r>
+          </a:p>
+          <a:p>
+            <a:pPr algn="just"/>
+            <a:endParaRPr lang="da-DK" dirty="0"/>
+          </a:p>
+          <a:p>
+            <a:pPr algn="just"/>
+            <a:endParaRPr lang="da-DK" dirty="0"/>
+          </a:p>
+          <a:p>
+            <a:pPr algn="just"/>
+            <a:endParaRPr lang="da-DK" dirty="0"/>
+          </a:p>
+          <a:p>
+            <a:pPr algn="just"/>
+            <a:endParaRPr lang="da-DK" dirty="0"/>
+          </a:p>
+        </p:txBody>
+      </p:sp>
+      <p:sp>
+        <p:nvSpPr>
+          <p:cNvPr id="5" name="2 CuadroTexto">
+            <a:extLst>
+              <a:ext uri="{FF2B5EF4-FFF2-40B4-BE49-F238E27FC236}">
+                <a16:creationId xmlns:a16="http://schemas.microsoft.com/office/drawing/2014/main" id="{5F6F7655-4154-4A7E-B2BF-52CACBB3E80F}"/>
+              </a:ext>
+            </a:extLst>
+          </p:cNvPr>
+          <p:cNvSpPr txBox="1"/>
+          <p:nvPr/>
+        </p:nvSpPr>
+        <p:spPr>
+          <a:xfrm>
+            <a:off x="0" y="6437299"/>
+            <a:ext cx="9137117" cy="569387"/>
+          </a:xfrm>
+          <a:prstGeom prst="rect">
+            <a:avLst/>
+          </a:prstGeom>
+          <a:noFill/>
+        </p:spPr>
+        <p:txBody>
+          <a:bodyPr wrap="none" rtlCol="0">
+            <a:spAutoFit/>
+          </a:bodyPr>
+          <a:lstStyle/>
+          <a:p>
             <a:r>
               <a:rPr lang="en-US" sz="1500" dirty="0"/>
-              <a:t> 2020 – April 24 - 26</a:t>
+              <a:t>Copenhagen Bioinformatics Hackathon 2020 – April 24 - 26 ---  </a:t>
+            </a:r>
+            <a:r>
+              <a:rPr lang="da-DK" sz="1600" dirty="0">
+                <a:hlinkClick r:id="rId4"/>
+              </a:rPr>
+              <a:t>https://github.com/lassefolkersen/hackaton_art </a:t>
+            </a:r>
+            <a:endParaRPr lang="da-DK" sz="1600" dirty="0"/>
+          </a:p>
+          <a:p>
+            <a:endParaRPr lang="en-US" sz="1500" dirty="0"/>
+          </a:p>
+        </p:txBody>
+      </p:sp>
+    </p:spTree>
+    <p:extLst>
+      <p:ext uri="{BB962C8B-B14F-4D97-AF65-F5344CB8AC3E}">
+        <p14:creationId xmlns:p14="http://schemas.microsoft.com/office/powerpoint/2010/main" val="3064198759"/>
+      </p:ext>
+    </p:extLst>
+  </p:cSld>
+  <p:clrMapOvr>
+    <a:masterClrMapping/>
+  </p:clrMapOvr>
+</p:sld>
+</file>
+
+<file path=ppt/slides/slide8.xml><?xml version="1.0" encoding="utf-8"?>
+<p:sld xmlns:a="http://schemas.openxmlformats.org/drawingml/2006/main" xmlns:r="http://schemas.openxmlformats.org/officeDocument/2006/relationships" xmlns:p="http://schemas.openxmlformats.org/presentationml/2006/main">
+  <p:cSld>
+    <p:spTree>
+      <p:nvGrpSpPr>
+        <p:cNvPr id="1" name=""/>
+        <p:cNvGrpSpPr/>
+        <p:nvPr/>
+      </p:nvGrpSpPr>
+      <p:grpSpPr>
+        <a:xfrm>
+          <a:off x="0" y="0"/>
+          <a:ext cx="0" cy="0"/>
+          <a:chOff x="0" y="0"/>
+          <a:chExt cx="0" cy="0"/>
+        </a:xfrm>
+      </p:grpSpPr>
+      <p:sp>
+        <p:nvSpPr>
+          <p:cNvPr id="10" name="Title 9">
+            <a:extLst>
+              <a:ext uri="{FF2B5EF4-FFF2-40B4-BE49-F238E27FC236}">
+                <a16:creationId xmlns:a16="http://schemas.microsoft.com/office/drawing/2014/main" id="{24FAFA63-EF73-4268-8107-6CD20923D700}"/>
+              </a:ext>
+            </a:extLst>
+          </p:cNvPr>
+          <p:cNvSpPr>
+            <a:spLocks noGrp="1"/>
+          </p:cNvSpPr>
+          <p:nvPr>
+            <p:ph type="title"/>
+          </p:nvPr>
+        </p:nvSpPr>
+        <p:spPr>
+          <a:xfrm>
+            <a:off x="0" y="239449"/>
+            <a:ext cx="12192000" cy="571301"/>
+          </a:xfrm>
+          <a:solidFill>
+            <a:schemeClr val="accent2"/>
+          </a:solidFill>
+        </p:spPr>
+        <p:txBody>
+          <a:bodyPr lIns="468000" tIns="36000" rIns="180000" bIns="36000"/>
+          <a:lstStyle/>
+          <a:p>
+            <a:r>
+              <a:rPr lang="en-US" b="0" dirty="0">
+                <a:solidFill>
+                  <a:schemeClr val="bg1"/>
+                </a:solidFill>
+              </a:rPr>
+              <a:t>Resources available</a:t>
             </a:r>
           </a:p>
         </p:txBody>
@@ -12369,7 +12872,7 @@
             </a:r>
             <a:r>
               <a:rPr lang="en-GB" sz="2000" dirty="0"/>
-              <a:t>:. Genomic data from 51 example-genomes are available in standard impute-me format</a:t>
+              <a:t>: Genomic data from 51 example-genomes are available in standard impute-me format</a:t>
             </a:r>
           </a:p>
           <a:p>
@@ -12430,6 +12933,51 @@
               <a:rPr lang="en-US" sz="2000" dirty="0"/>
               <a:t> </a:t>
             </a:r>
+          </a:p>
+        </p:txBody>
+      </p:sp>
+      <p:sp>
+        <p:nvSpPr>
+          <p:cNvPr id="5" name="2 CuadroTexto">
+            <a:extLst>
+              <a:ext uri="{FF2B5EF4-FFF2-40B4-BE49-F238E27FC236}">
+                <a16:creationId xmlns:a16="http://schemas.microsoft.com/office/drawing/2014/main" id="{AB90F55D-F268-4A85-80DD-EB37F4A67BB0}"/>
+              </a:ext>
+            </a:extLst>
+          </p:cNvPr>
+          <p:cNvSpPr txBox="1"/>
+          <p:nvPr/>
+        </p:nvSpPr>
+        <p:spPr>
+          <a:xfrm>
+            <a:off x="0" y="6437299"/>
+            <a:ext cx="9137117" cy="569387"/>
+          </a:xfrm>
+          <a:prstGeom prst="rect">
+            <a:avLst/>
+          </a:prstGeom>
+          <a:noFill/>
+        </p:spPr>
+        <p:txBody>
+          <a:bodyPr wrap="none" rtlCol="0">
+            <a:spAutoFit/>
+          </a:bodyPr>
+          <a:lstStyle/>
+          <a:p>
+            <a:r>
+              <a:rPr lang="en-US" sz="1500" dirty="0"/>
+              <a:t>Copenhagen Bioinformatics Hackathon 2020 – April 24 - 26 ---  </a:t>
+            </a:r>
+            <a:r>
+              <a:rPr lang="da-DK" sz="1600" dirty="0">
+                <a:hlinkClick r:id="rId3"/>
+              </a:rPr>
+              <a:t>https://github.com/lassefolkersen/hackaton_art </a:t>
+            </a:r>
+            <a:endParaRPr lang="da-DK" sz="1600" dirty="0"/>
+          </a:p>
+          <a:p>
+            <a:endParaRPr lang="en-US" sz="1500" dirty="0"/>
           </a:p>
         </p:txBody>
       </p:sp>
@@ -13301,6 +13849,24 @@
 </file>
 
 <file path=customXml/item1.xml><?xml version="1.0" encoding="utf-8"?>
+<?mso-contentType ?>
+<FormTemplates xmlns="http://schemas.microsoft.com/sharepoint/v3/contenttype/forms">
+  <Display>DocumentLibraryForm</Display>
+  <Edit>DocumentLibraryForm</Edit>
+  <New>DocumentLibraryForm</New>
+</FormTemplates>
+</file>
+
+<file path=customXml/item2.xml><?xml version="1.0" encoding="utf-8"?>
+<p:properties xmlns:p="http://schemas.microsoft.com/office/2006/metadata/properties" xmlns:xsi="http://www.w3.org/2001/XMLSchema-instance" xmlns:pc="http://schemas.microsoft.com/office/infopath/2007/PartnerControls">
+  <documentManagement>
+    <_ip_UnifiedCompliancePolicyUIAction xmlns="http://schemas.microsoft.com/sharepoint/v3" xsi:nil="true"/>
+    <_ip_UnifiedCompliancePolicyProperties xmlns="http://schemas.microsoft.com/sharepoint/v3" xsi:nil="true"/>
+  </documentManagement>
+</p:properties>
+</file>
+
+<file path=customXml/item3.xml><?xml version="1.0" encoding="utf-8"?>
 <ct:contentTypeSchema xmlns:ct="http://schemas.microsoft.com/office/2006/metadata/contentType" xmlns:ma="http://schemas.microsoft.com/office/2006/metadata/properties/metaAttributes" ct:_="" ma:_="" ma:contentTypeName="Document" ma:contentTypeID="0x010100DEEA25CC0A0AC24199CDC46C25B8B0BC" ma:contentTypeVersion="10" ma:contentTypeDescription="Create a new document." ma:contentTypeScope="" ma:versionID="e3b47856d4cf355c0dacb39e1084d14f">
   <xsd:schema xmlns:xsd="http://www.w3.org/2001/XMLSchema" xmlns:xs="http://www.w3.org/2001/XMLSchema" xmlns:p="http://schemas.microsoft.com/office/2006/metadata/properties" xmlns:ns1="http://schemas.microsoft.com/sharepoint/v3" xmlns:ns2="6dc4bcd6-49db-4c07-9060-8acfc67cef9f" xmlns:ns3="fb0879af-3eba-417a-a55a-ffe6dcd6ca77" targetNamespace="http://schemas.microsoft.com/office/2006/metadata/properties" ma:root="true" ma:fieldsID="a845a615265fdb1f7b12cc65ac20ecbd" ns1:_="" ns2:_="" ns3:_="">
     <xsd:import namespace="http://schemas.microsoft.com/sharepoint/v3"/>
@@ -13508,40 +14074,10 @@
 </ct:contentTypeSchema>
 </file>
 
-<file path=customXml/item2.xml><?xml version="1.0" encoding="utf-8"?>
-<p:properties xmlns:p="http://schemas.microsoft.com/office/2006/metadata/properties" xmlns:xsi="http://www.w3.org/2001/XMLSchema-instance" xmlns:pc="http://schemas.microsoft.com/office/infopath/2007/PartnerControls">
-  <documentManagement>
-    <_ip_UnifiedCompliancePolicyUIAction xmlns="http://schemas.microsoft.com/sharepoint/v3" xsi:nil="true"/>
-    <_ip_UnifiedCompliancePolicyProperties xmlns="http://schemas.microsoft.com/sharepoint/v3" xsi:nil="true"/>
-  </documentManagement>
-</p:properties>
-</file>
-
-<file path=customXml/item3.xml><?xml version="1.0" encoding="utf-8"?>
-<?mso-contentType ?>
-<FormTemplates xmlns="http://schemas.microsoft.com/sharepoint/v3/contenttype/forms">
-  <Display>DocumentLibraryForm</Display>
-  <Edit>DocumentLibraryForm</Edit>
-  <New>DocumentLibraryForm</New>
-</FormTemplates>
-</file>
-
 <file path=customXml/itemProps1.xml><?xml version="1.0" encoding="utf-8"?>
-<ds:datastoreItem xmlns:ds="http://schemas.openxmlformats.org/officeDocument/2006/customXml" ds:itemID="{67D8A4B1-1036-4F2B-9C1A-A86F68D31427}">
+<ds:datastoreItem xmlns:ds="http://schemas.openxmlformats.org/officeDocument/2006/customXml" ds:itemID="{723BE856-B6C2-4675-AE16-47A27D415D46}">
   <ds:schemaRefs>
-    <ds:schemaRef ds:uri="http://schemas.microsoft.com/office/2006/metadata/contentType"/>
-    <ds:schemaRef ds:uri="http://schemas.microsoft.com/office/2006/metadata/properties/metaAttributes"/>
-    <ds:schemaRef ds:uri="http://www.w3.org/2001/XMLSchema"/>
-    <ds:schemaRef ds:uri="http://schemas.microsoft.com/office/2006/metadata/properties"/>
-    <ds:schemaRef ds:uri="http://schemas.microsoft.com/sharepoint/v3"/>
-    <ds:schemaRef ds:uri="6dc4bcd6-49db-4c07-9060-8acfc67cef9f"/>
-    <ds:schemaRef ds:uri="fb0879af-3eba-417a-a55a-ffe6dcd6ca77"/>
-    <ds:schemaRef ds:uri="http://schemas.microsoft.com/office/2006/documentManagement/types"/>
-    <ds:schemaRef ds:uri="http://schemas.microsoft.com/office/infopath/2007/PartnerControls"/>
-    <ds:schemaRef ds:uri="http://schemas.openxmlformats.org/package/2006/metadata/core-properties"/>
-    <ds:schemaRef ds:uri="http://purl.org/dc/elements/1.1/"/>
-    <ds:schemaRef ds:uri="http://purl.org/dc/terms/"/>
-    <ds:schemaRef ds:uri="http://schemas.microsoft.com/internal/obd"/>
+    <ds:schemaRef ds:uri="http://schemas.microsoft.com/sharepoint/v3/contenttype/forms"/>
   </ds:schemaRefs>
 </ds:datastoreItem>
 </file>
@@ -13565,9 +14101,21 @@
 </file>
 
 <file path=customXml/itemProps3.xml><?xml version="1.0" encoding="utf-8"?>
-<ds:datastoreItem xmlns:ds="http://schemas.openxmlformats.org/officeDocument/2006/customXml" ds:itemID="{723BE856-B6C2-4675-AE16-47A27D415D46}">
+<ds:datastoreItem xmlns:ds="http://schemas.openxmlformats.org/officeDocument/2006/customXml" ds:itemID="{67D8A4B1-1036-4F2B-9C1A-A86F68D31427}">
   <ds:schemaRefs>
-    <ds:schemaRef ds:uri="http://schemas.microsoft.com/sharepoint/v3/contenttype/forms"/>
+    <ds:schemaRef ds:uri="http://schemas.microsoft.com/office/2006/metadata/contentType"/>
+    <ds:schemaRef ds:uri="http://schemas.microsoft.com/office/2006/metadata/properties/metaAttributes"/>
+    <ds:schemaRef ds:uri="http://www.w3.org/2001/XMLSchema"/>
+    <ds:schemaRef ds:uri="http://schemas.microsoft.com/office/2006/metadata/properties"/>
+    <ds:schemaRef ds:uri="http://schemas.microsoft.com/sharepoint/v3"/>
+    <ds:schemaRef ds:uri="6dc4bcd6-49db-4c07-9060-8acfc67cef9f"/>
+    <ds:schemaRef ds:uri="fb0879af-3eba-417a-a55a-ffe6dcd6ca77"/>
+    <ds:schemaRef ds:uri="http://schemas.microsoft.com/office/2006/documentManagement/types"/>
+    <ds:schemaRef ds:uri="http://schemas.microsoft.com/office/infopath/2007/PartnerControls"/>
+    <ds:schemaRef ds:uri="http://schemas.openxmlformats.org/package/2006/metadata/core-properties"/>
+    <ds:schemaRef ds:uri="http://purl.org/dc/elements/1.1/"/>
+    <ds:schemaRef ds:uri="http://purl.org/dc/terms/"/>
+    <ds:schemaRef ds:uri="http://schemas.microsoft.com/internal/obd"/>
   </ds:schemaRefs>
 </ds:datastoreItem>
 </file>
</xml_diff>